<commit_message>
Added Aggregation, filters(OfType), lookup.
</commit_message>
<xml_diff>
--- a/LinqOperators.pptx
+++ b/LinqOperators.pptx
@@ -12802,6 +12802,13 @@
   <p:clrMapOvr>
     <a:masterClrMapping/>
   </p:clrMapOvr>
+  <p:timing>
+    <p:tnLst>
+      <p:par>
+        <p:cTn id="1" dur="indefinite" restart="never" nodeType="tmRoot"/>
+      </p:par>
+    </p:tnLst>
+  </p:timing>
 </p:sld>
 </file>
 
@@ -13440,7 +13447,7 @@
             </a:r>
             <a:r>
               <a:rPr lang="ru-RU" sz="1200" dirty="0" smtClean="0"/>
-              <a:t>которая часто состоит только из этих свойств, которые впоследствии используются</a:t>
+              <a:t>которая часто состоит только из свойств этого объекта, которые впоследствии используются</a:t>
             </a:r>
             <a:r>
               <a:rPr lang="ru-RU" sz="1300" dirty="0" smtClean="0">
@@ -16048,7 +16055,15 @@
             </a:r>
             <a:r>
               <a:rPr lang="ru-RU" dirty="0"/>
-              <a:t>разделения входной последовательности на два раздела без изменения порядка элементов, а затем возвращения одного из разделов</a:t>
+              <a:t>разделения входной последовательности на </a:t>
+            </a:r>
+            <a:r>
+              <a:rPr lang="ru-RU" dirty="0" smtClean="0"/>
+              <a:t>разделы </a:t>
+            </a:r>
+            <a:r>
+              <a:rPr lang="ru-RU" dirty="0"/>
+              <a:t>без изменения порядка элементов, а затем возвращения одного из разделов</a:t>
             </a:r>
             <a:r>
               <a:rPr lang="ru-RU" dirty="0" smtClean="0"/>
@@ -20096,7 +20111,7 @@
 </file>
 
 <file path=ppt/slides/slide42.xml><?xml version="1.0" encoding="utf-8"?>
-<p:sld xmlns:a="http://schemas.openxmlformats.org/drawingml/2006/main" xmlns:r="http://schemas.openxmlformats.org/officeDocument/2006/relationships" xmlns:p="http://schemas.openxmlformats.org/presentationml/2006/main" show="0">
+<p:sld xmlns:a="http://schemas.openxmlformats.org/drawingml/2006/main" xmlns:r="http://schemas.openxmlformats.org/officeDocument/2006/relationships" xmlns:p="http://schemas.openxmlformats.org/presentationml/2006/main">
   <p:cSld>
     <p:spTree>
       <p:nvGrpSpPr>
@@ -20163,7 +20178,7 @@
         <p:spPr>
           <a:xfrm>
             <a:off x="583096" y="1009926"/>
-            <a:ext cx="8107754" cy="3262432"/>
+            <a:ext cx="8107754" cy="3647152"/>
           </a:xfrm>
           <a:prstGeom prst="rect">
             <a:avLst/>
@@ -20175,438 +20190,297 @@
           </a:bodyPr>
           <a:lstStyle/>
           <a:p>
-            <a:pPr marL="463550" indent="-342900">
-              <a:buAutoNum type="arabicPeriod"/>
-            </a:pPr>
-            <a:r>
-              <a:rPr lang="ru-RU" dirty="0" smtClean="0"/>
-              <a:t>Напишите запрос к коллекции </a:t>
-            </a:r>
-            <a:r>
-              <a:rPr lang="en-US" dirty="0" err="1">
-                <a:solidFill>
-                  <a:schemeClr val="accent1">
-                    <a:lumMod val="75000"/>
-                  </a:schemeClr>
-                </a:solidFill>
-              </a:rPr>
-              <a:t>int</a:t>
-            </a:r>
-            <a:r>
-              <a:rPr lang="en-US" dirty="0"/>
+            <a:pPr marL="463550" indent="-342900"/>
+            <a:r>
+              <a:rPr lang="ru-RU" sz="1100" dirty="0" smtClean="0"/>
+              <a:t>1 Дана </a:t>
+            </a:r>
+            <a:r>
+              <a:rPr lang="ru-RU" sz="1100" dirty="0" smtClean="0"/>
+              <a:t>коллекция:</a:t>
+            </a:r>
+          </a:p>
+          <a:p>
+            <a:pPr marL="463550" indent="-342900"/>
+            <a:r>
+              <a:rPr lang="ru-RU" sz="1100" dirty="0" err="1" smtClean="0"/>
+              <a:t>string</a:t>
+            </a:r>
+            <a:r>
+              <a:rPr lang="ru-RU" sz="1100" dirty="0" smtClean="0"/>
               <a:t>[] </a:t>
             </a:r>
             <a:r>
-              <a:rPr lang="en-US" dirty="0">
-                <a:solidFill>
-                  <a:schemeClr val="accent1">
-                    <a:lumMod val="50000"/>
-                  </a:schemeClr>
-                </a:solidFill>
-              </a:rPr>
-              <a:t>numbers =</a:t>
-            </a:r>
-            <a:r>
-              <a:rPr lang="en-US" dirty="0"/>
-              <a:t> { 1, 2, 3, 4, 5, 6, 7, 8, 9, 10 </a:t>
-            </a:r>
-            <a:r>
-              <a:rPr lang="en-US" dirty="0" smtClean="0"/>
-              <a:t>}</a:t>
-            </a:r>
-            <a:r>
-              <a:rPr lang="ru-RU" dirty="0" smtClean="0"/>
-              <a:t>, который вернет все числа кратные 3.</a:t>
-            </a:r>
-          </a:p>
-          <a:p>
-            <a:pPr marL="463550" indent="-342900">
-              <a:buAutoNum type="arabicPeriod"/>
-            </a:pPr>
-            <a:r>
-              <a:rPr lang="ru-RU" dirty="0" smtClean="0"/>
-              <a:t>Напишите запрос к коллекции из п.1, который вернет объект(любого типа), содержащий число из коллекции, например </a:t>
-            </a:r>
-            <a:r>
-              <a:rPr lang="en-US" dirty="0" smtClean="0">
-                <a:solidFill>
-                  <a:srgbClr val="669900"/>
-                </a:solidFill>
-              </a:rPr>
-              <a:t>Student</a:t>
-            </a:r>
-            <a:r>
-              <a:rPr lang="en-US" dirty="0" smtClean="0">
-                <a:solidFill>
-                  <a:schemeClr val="tx1"/>
-                </a:solidFill>
-              </a:rPr>
-              <a:t>, </a:t>
-            </a:r>
-            <a:r>
-              <a:rPr lang="ru-RU" dirty="0" smtClean="0">
-                <a:solidFill>
-                  <a:schemeClr val="tx1"/>
-                </a:solidFill>
-              </a:rPr>
-              <a:t>в котором </a:t>
-            </a:r>
-            <a:r>
-              <a:rPr lang="en-US" dirty="0" err="1"/>
-              <a:t>StudentId</a:t>
-            </a:r>
-            <a:r>
-              <a:rPr lang="en-US" dirty="0"/>
-              <a:t> </a:t>
-            </a:r>
-            <a:r>
-              <a:rPr lang="en-US" dirty="0" smtClean="0"/>
-              <a:t>=</a:t>
-            </a:r>
-            <a:r>
-              <a:rPr lang="ru-RU" dirty="0" smtClean="0"/>
-              <a:t> </a:t>
-            </a:r>
-            <a:r>
-              <a:rPr lang="en-US" dirty="0" smtClean="0"/>
-              <a:t>n(n – </a:t>
-            </a:r>
-            <a:r>
-              <a:rPr lang="ru-RU" dirty="0" smtClean="0"/>
-              <a:t>число из коллекции п.1</a:t>
-            </a:r>
-            <a:r>
-              <a:rPr lang="en-US" dirty="0" smtClean="0"/>
-              <a:t>)</a:t>
-            </a:r>
-            <a:r>
-              <a:rPr lang="en-US" dirty="0"/>
-              <a:t>;</a:t>
-            </a:r>
-            <a:endParaRPr lang="ru-RU" dirty="0" smtClean="0">
-              <a:solidFill>
-                <a:schemeClr val="tx1"/>
-              </a:solidFill>
-            </a:endParaRPr>
-          </a:p>
-          <a:p>
-            <a:pPr marL="463550" indent="-342900">
-              <a:buAutoNum type="arabicPeriod"/>
-            </a:pPr>
-            <a:r>
-              <a:rPr lang="ru-RU" dirty="0" smtClean="0"/>
-              <a:t>Напишите запрос к коллекции </a:t>
-            </a:r>
-          </a:p>
-          <a:p>
-            <a:pPr lvl="2"/>
-            <a:r>
-              <a:rPr lang="en-US" sz="1100" dirty="0" smtClean="0">
-                <a:solidFill>
-                  <a:srgbClr val="669900"/>
-                </a:solidFill>
-              </a:rPr>
-              <a:t>List</a:t>
-            </a:r>
-            <a:r>
-              <a:rPr lang="en-US" sz="1100" dirty="0" smtClean="0"/>
-              <a:t>&lt;</a:t>
-            </a:r>
-            <a:r>
-              <a:rPr lang="en-US" sz="1100" dirty="0" smtClean="0">
-                <a:solidFill>
-                  <a:srgbClr val="669900"/>
-                </a:solidFill>
-              </a:rPr>
-              <a:t>Student</a:t>
-            </a:r>
-            <a:r>
-              <a:rPr lang="en-US" sz="1100" dirty="0" smtClean="0"/>
-              <a:t>&gt; </a:t>
-            </a:r>
-            <a:r>
-              <a:rPr lang="en-US" sz="1100" dirty="0" smtClean="0">
-                <a:solidFill>
-                  <a:schemeClr val="accent1">
-                    <a:lumMod val="50000"/>
-                  </a:schemeClr>
-                </a:solidFill>
-              </a:rPr>
-              <a:t>students</a:t>
-            </a:r>
-            <a:r>
-              <a:rPr lang="en-US" sz="1100" dirty="0" smtClean="0"/>
-              <a:t> = new </a:t>
-            </a:r>
-            <a:r>
-              <a:rPr lang="en-US" sz="1100" dirty="0" smtClean="0">
-                <a:solidFill>
-                  <a:srgbClr val="669900"/>
-                </a:solidFill>
-              </a:rPr>
-              <a:t>List</a:t>
-            </a:r>
-            <a:r>
-              <a:rPr lang="en-US" sz="1100" dirty="0" smtClean="0"/>
-              <a:t>&lt;</a:t>
-            </a:r>
-            <a:r>
-              <a:rPr lang="en-US" sz="1100" dirty="0" smtClean="0">
-                <a:solidFill>
-                  <a:srgbClr val="669900"/>
-                </a:solidFill>
-              </a:rPr>
-              <a:t>Student</a:t>
-            </a:r>
-            <a:r>
-              <a:rPr lang="en-US" sz="1100" dirty="0" smtClean="0"/>
-              <a:t>&gt; </a:t>
-            </a:r>
-          </a:p>
-          <a:p>
-            <a:pPr lvl="2"/>
+              <a:rPr lang="ru-RU" sz="1100" dirty="0" err="1" smtClean="0"/>
+              <a:t>words</a:t>
+            </a:r>
             <a:r>
               <a:rPr lang="ru-RU" sz="1100" dirty="0" smtClean="0"/>
-              <a:t>{ </a:t>
-            </a:r>
-          </a:p>
-          <a:p>
-            <a:pPr lvl="2"/>
-            <a:r>
-              <a:rPr lang="en-US" sz="1100" dirty="0" smtClean="0"/>
-              <a:t>    </a:t>
-            </a:r>
-            <a:r>
-              <a:rPr lang="en-US" sz="1100" dirty="0" smtClean="0">
-                <a:solidFill>
-                  <a:schemeClr val="accent1">
-                    <a:lumMod val="75000"/>
-                  </a:schemeClr>
-                </a:solidFill>
-              </a:rPr>
-              <a:t>new</a:t>
-            </a:r>
-            <a:r>
-              <a:rPr lang="en-US" sz="1100" dirty="0" smtClean="0"/>
-              <a:t> </a:t>
-            </a:r>
-            <a:r>
-              <a:rPr lang="en-US" sz="1100" dirty="0" smtClean="0">
-                <a:solidFill>
-                  <a:srgbClr val="669900"/>
-                </a:solidFill>
-              </a:rPr>
-              <a:t>Student</a:t>
-            </a:r>
-            <a:r>
-              <a:rPr lang="en-US" sz="1100" dirty="0" smtClean="0"/>
-              <a:t> { </a:t>
-            </a:r>
-            <a:r>
-              <a:rPr lang="en-US" sz="1100" dirty="0" err="1" smtClean="0"/>
-              <a:t>StudentId</a:t>
-            </a:r>
-            <a:r>
-              <a:rPr lang="en-US" sz="1100" dirty="0" smtClean="0"/>
-              <a:t> = 1, Name = "</a:t>
-            </a:r>
-            <a:r>
-              <a:rPr lang="en-US" sz="1100" dirty="0" smtClean="0">
-                <a:solidFill>
-                  <a:srgbClr val="C00000"/>
-                </a:solidFill>
-              </a:rPr>
-              <a:t>Ivanov</a:t>
-            </a:r>
-            <a:r>
-              <a:rPr lang="en-US" sz="1100" dirty="0" smtClean="0"/>
+              <a:t> = ["</a:t>
+            </a:r>
+            <a:r>
+              <a:rPr lang="ru-RU" sz="1100" dirty="0" err="1" smtClean="0"/>
+              <a:t>the</a:t>
+            </a:r>
+            <a:r>
+              <a:rPr lang="ru-RU" sz="1100" dirty="0" smtClean="0"/>
+              <a:t>", "</a:t>
+            </a:r>
+            <a:r>
+              <a:rPr lang="ru-RU" sz="1100" dirty="0" err="1" smtClean="0"/>
+              <a:t>quick</a:t>
+            </a:r>
+            <a:r>
+              <a:rPr lang="ru-RU" sz="1100" dirty="0" smtClean="0"/>
+              <a:t>", "</a:t>
+            </a:r>
+            <a:r>
+              <a:rPr lang="ru-RU" sz="1100" dirty="0" err="1" smtClean="0"/>
+              <a:t>brown</a:t>
+            </a:r>
+            <a:r>
+              <a:rPr lang="ru-RU" sz="1100" dirty="0" smtClean="0"/>
+              <a:t>", "</a:t>
+            </a:r>
+            <a:r>
+              <a:rPr lang="ru-RU" sz="1100" dirty="0" err="1" smtClean="0"/>
+              <a:t>fox</a:t>
+            </a:r>
+            <a:r>
+              <a:rPr lang="ru-RU" sz="1100" dirty="0" smtClean="0"/>
+              <a:t>", "</a:t>
+            </a:r>
+            <a:r>
+              <a:rPr lang="ru-RU" sz="1100" dirty="0" err="1" smtClean="0"/>
+              <a:t>jumps</a:t>
+            </a:r>
+            <a:r>
+              <a:rPr lang="ru-RU" sz="1100" dirty="0" smtClean="0"/>
               <a:t>", </a:t>
             </a:r>
             <a:r>
-              <a:rPr lang="en-US" sz="1100" dirty="0" err="1" smtClean="0"/>
-              <a:t>GroupId</a:t>
-            </a:r>
-            <a:r>
-              <a:rPr lang="en-US" sz="1100" dirty="0" smtClean="0"/>
-              <a:t> = 1 },</a:t>
-            </a:r>
-          </a:p>
-          <a:p>
-            <a:pPr lvl="2"/>
-            <a:r>
-              <a:rPr lang="en-US" sz="1100" dirty="0" smtClean="0"/>
-              <a:t>    </a:t>
-            </a:r>
-            <a:r>
-              <a:rPr lang="en-US" sz="1100" dirty="0" smtClean="0">
-                <a:solidFill>
-                  <a:schemeClr val="accent1">
-                    <a:lumMod val="75000"/>
-                  </a:schemeClr>
-                </a:solidFill>
-              </a:rPr>
-              <a:t>new</a:t>
-            </a:r>
-            <a:r>
-              <a:rPr lang="en-US" sz="1100" dirty="0" smtClean="0"/>
-              <a:t> </a:t>
-            </a:r>
-            <a:r>
-              <a:rPr lang="en-US" sz="1100" dirty="0" smtClean="0">
-                <a:solidFill>
-                  <a:srgbClr val="669900"/>
-                </a:solidFill>
-              </a:rPr>
-              <a:t>Student</a:t>
-            </a:r>
-            <a:r>
-              <a:rPr lang="en-US" sz="1100" dirty="0" smtClean="0"/>
-              <a:t> { </a:t>
-            </a:r>
-            <a:r>
-              <a:rPr lang="en-US" sz="1100" dirty="0" err="1" smtClean="0"/>
-              <a:t>StudentId</a:t>
-            </a:r>
-            <a:r>
-              <a:rPr lang="en-US" sz="1100" dirty="0" smtClean="0"/>
-              <a:t> = 2, Name = "</a:t>
-            </a:r>
-            <a:r>
-              <a:rPr lang="en-US" sz="1100" dirty="0" err="1" smtClean="0">
-                <a:solidFill>
-                  <a:srgbClr val="C00000"/>
-                </a:solidFill>
-              </a:rPr>
-              <a:t>Petrov</a:t>
-            </a:r>
-            <a:r>
-              <a:rPr lang="en-US" sz="1100" dirty="0" smtClean="0"/>
+              <a:rPr lang="ru-RU" sz="1100" dirty="0" err="1" smtClean="0"/>
+              <a:t>null</a:t>
+            </a:r>
+            <a:r>
+              <a:rPr lang="ru-RU" sz="1100" dirty="0" smtClean="0"/>
+              <a:t>];</a:t>
+            </a:r>
+          </a:p>
+          <a:p>
+            <a:pPr marL="463550" indent="-342900"/>
+            <a:r>
+              <a:rPr lang="ru-RU" sz="1100" dirty="0" smtClean="0"/>
+              <a:t>1.1 </a:t>
+            </a:r>
+            <a:r>
+              <a:rPr lang="ru-RU" sz="1100" dirty="0" smtClean="0"/>
+              <a:t>Напишите linq-запрос, которые будет возвращать все значения, кроме </a:t>
+            </a:r>
+            <a:r>
+              <a:rPr lang="ru-RU" sz="1100" dirty="0" err="1" smtClean="0"/>
+              <a:t>null</a:t>
+            </a:r>
+            <a:r>
+              <a:rPr lang="ru-RU" sz="1100" dirty="0" smtClean="0"/>
+              <a:t>.</a:t>
+            </a:r>
+          </a:p>
+          <a:p>
+            <a:pPr marL="463550" indent="-342900"/>
+            <a:r>
+              <a:rPr lang="ru-RU" sz="1100" dirty="0" smtClean="0"/>
+              <a:t>1.2 Напишите запрос, который вернет минимальную длину слова из запроса ниже(без учета </a:t>
+            </a:r>
+            <a:r>
+              <a:rPr lang="ru-RU" sz="1100" dirty="0" err="1" smtClean="0"/>
+              <a:t>null</a:t>
+            </a:r>
+            <a:r>
+              <a:rPr lang="ru-RU" sz="1100" dirty="0" smtClean="0"/>
+              <a:t>).</a:t>
+            </a:r>
+          </a:p>
+          <a:p>
+            <a:pPr marL="463550" indent="-342900"/>
+            <a:r>
+              <a:rPr lang="ru-RU" sz="1100" dirty="0" smtClean="0"/>
+              <a:t>2 Дан массив студентов. Опишите класс студента самостоятельно. У студента есть идентификатор, имя и номер группы.</a:t>
+            </a:r>
+          </a:p>
+          <a:p>
+            <a:pPr marL="463550" indent="-342900"/>
+            <a:r>
+              <a:rPr lang="ru-RU" sz="1100" dirty="0" smtClean="0"/>
+              <a:t>2.1 Сгруппируйте студентов по первой букве имени. Пример: А - Александр, Алексей, Б - Борис, Брюс и пр.</a:t>
+            </a:r>
+          </a:p>
+          <a:p>
+            <a:pPr marL="463550" indent="-342900"/>
+            <a:r>
+              <a:rPr lang="ru-RU" sz="1100" dirty="0" smtClean="0"/>
+              <a:t>2.2 </a:t>
+            </a:r>
+            <a:r>
+              <a:rPr lang="ru-RU" sz="1100" dirty="0" err="1" smtClean="0"/>
+              <a:t>Просортируйте</a:t>
+            </a:r>
+            <a:r>
+              <a:rPr lang="ru-RU" sz="1100" dirty="0" smtClean="0"/>
+              <a:t> последовательность из п.2.1 в обратном порядке. Пример: сначала идут на Я - Яков, в конце идут - Алексей, Александр.</a:t>
+            </a:r>
+          </a:p>
+          <a:p>
+            <a:pPr marL="463550" indent="-342900"/>
+            <a:r>
+              <a:rPr lang="ru-RU" sz="1100" dirty="0" smtClean="0"/>
+              <a:t>3 Соедините последовательности (</a:t>
+            </a:r>
+            <a:r>
+              <a:rPr lang="ru-RU" sz="1100" dirty="0" err="1" smtClean="0"/>
+              <a:t>join</a:t>
+            </a:r>
+            <a:r>
+              <a:rPr lang="ru-RU" sz="1100" dirty="0" smtClean="0"/>
+              <a:t>) работников(идентификатор, имя, возраст, оклад, ид отдела) и их отделов(идентификатор, наименование отдела).</a:t>
+            </a:r>
+          </a:p>
+          <a:p>
+            <a:pPr marL="463550" indent="-342900"/>
+            <a:r>
+              <a:rPr lang="ru-RU" sz="1100" dirty="0" smtClean="0"/>
+              <a:t>3.1 Получите результирующий набор в виде - идентификатор работника, наименование отдела, оклад.</a:t>
+            </a:r>
+          </a:p>
+          <a:p>
+            <a:pPr marL="463550" indent="-342900"/>
+            <a:r>
+              <a:rPr lang="ru-RU" sz="1100" dirty="0" smtClean="0"/>
+              <a:t>3.2 Получите последовательность в виде: идентификатор отдела, наименование отдела, средний оклад работника.</a:t>
+            </a:r>
+          </a:p>
+          <a:p>
+            <a:pPr marL="463550" indent="-342900"/>
+            <a:r>
+              <a:rPr lang="ru-RU" sz="1100" dirty="0" smtClean="0"/>
+              <a:t>4 Дана коллекция:</a:t>
+            </a:r>
+          </a:p>
+          <a:p>
+            <a:pPr marL="463550" indent="-342900"/>
+            <a:r>
+              <a:rPr lang="ru-RU" sz="1100" dirty="0" err="1" smtClean="0"/>
+              <a:t>string</a:t>
+            </a:r>
+            <a:r>
+              <a:rPr lang="ru-RU" sz="1100" dirty="0" smtClean="0"/>
+              <a:t>[] </a:t>
+            </a:r>
+            <a:r>
+              <a:rPr lang="ru-RU" sz="1100" dirty="0" err="1" smtClean="0"/>
+              <a:t>words</a:t>
+            </a:r>
+            <a:r>
+              <a:rPr lang="ru-RU" sz="1100" dirty="0" smtClean="0"/>
+              <a:t> = ["</a:t>
+            </a:r>
+            <a:r>
+              <a:rPr lang="ru-RU" sz="1100" dirty="0" err="1" smtClean="0"/>
+              <a:t>the</a:t>
+            </a:r>
+            <a:r>
+              <a:rPr lang="ru-RU" sz="1100" dirty="0" smtClean="0"/>
+              <a:t>", "</a:t>
+            </a:r>
+            <a:r>
+              <a:rPr lang="ru-RU" sz="1100" dirty="0" err="1" smtClean="0"/>
+              <a:t>quick</a:t>
+            </a:r>
+            <a:r>
+              <a:rPr lang="ru-RU" sz="1100" dirty="0" smtClean="0"/>
+              <a:t>", "</a:t>
+            </a:r>
+            <a:r>
+              <a:rPr lang="ru-RU" sz="1100" dirty="0" err="1" smtClean="0"/>
+              <a:t>brown</a:t>
+            </a:r>
+            <a:r>
+              <a:rPr lang="ru-RU" sz="1100" dirty="0" smtClean="0"/>
+              <a:t>", "</a:t>
+            </a:r>
+            <a:r>
+              <a:rPr lang="ru-RU" sz="1100" dirty="0" err="1" smtClean="0"/>
+              <a:t>fox</a:t>
+            </a:r>
+            <a:r>
+              <a:rPr lang="ru-RU" sz="1100" dirty="0" smtClean="0"/>
+              <a:t>", "</a:t>
+            </a:r>
+            <a:r>
+              <a:rPr lang="ru-RU" sz="1100" dirty="0" err="1" smtClean="0"/>
+              <a:t>jumps</a:t>
+            </a:r>
+            <a:r>
+              <a:rPr lang="ru-RU" sz="1100" dirty="0" smtClean="0"/>
               <a:t>", </a:t>
             </a:r>
             <a:r>
-              <a:rPr lang="en-US" sz="1100" dirty="0" err="1" smtClean="0"/>
-              <a:t>GroupId</a:t>
-            </a:r>
-            <a:r>
-              <a:rPr lang="en-US" sz="1100" dirty="0" smtClean="0"/>
-              <a:t> = 2 },</a:t>
-            </a:r>
-          </a:p>
-          <a:p>
-            <a:pPr lvl="2"/>
-            <a:r>
-              <a:rPr lang="en-US" sz="1100" dirty="0" smtClean="0"/>
-              <a:t>    </a:t>
-            </a:r>
-            <a:r>
-              <a:rPr lang="en-US" sz="1100" dirty="0" smtClean="0">
-                <a:solidFill>
-                  <a:schemeClr val="accent1">
-                    <a:lumMod val="75000"/>
-                  </a:schemeClr>
-                </a:solidFill>
-              </a:rPr>
-              <a:t>new</a:t>
-            </a:r>
-            <a:r>
-              <a:rPr lang="en-US" sz="1100" dirty="0" smtClean="0"/>
-              <a:t> </a:t>
-            </a:r>
-            <a:r>
-              <a:rPr lang="en-US" sz="1100" dirty="0" smtClean="0">
-                <a:solidFill>
-                  <a:srgbClr val="669900"/>
-                </a:solidFill>
-              </a:rPr>
-              <a:t>Student</a:t>
-            </a:r>
-            <a:r>
-              <a:rPr lang="en-US" sz="1100" dirty="0" smtClean="0"/>
-              <a:t> { </a:t>
-            </a:r>
-            <a:r>
-              <a:rPr lang="en-US" sz="1100" dirty="0" err="1" smtClean="0"/>
-              <a:t>StudentId</a:t>
-            </a:r>
-            <a:r>
-              <a:rPr lang="en-US" sz="1100" dirty="0" smtClean="0"/>
-              <a:t> = </a:t>
+              <a:rPr lang="ru-RU" sz="1100" dirty="0" err="1" smtClean="0"/>
+              <a:t>string.Empty</a:t>
             </a:r>
             <a:r>
               <a:rPr lang="ru-RU" sz="1100" dirty="0" smtClean="0"/>
-              <a:t>3</a:t>
-            </a:r>
-            <a:r>
-              <a:rPr lang="en-US" sz="1100" dirty="0" smtClean="0"/>
-              <a:t>, Name = "</a:t>
-            </a:r>
-            <a:r>
-              <a:rPr lang="en-US" sz="1100" dirty="0" err="1" smtClean="0">
-                <a:solidFill>
-                  <a:srgbClr val="C00000"/>
-                </a:solidFill>
-              </a:rPr>
-              <a:t>Sidorov</a:t>
-            </a:r>
-            <a:r>
-              <a:rPr lang="en-US" sz="1100" dirty="0" smtClean="0"/>
-              <a:t>", </a:t>
-            </a:r>
-            <a:r>
-              <a:rPr lang="en-US" sz="1100" dirty="0" err="1" smtClean="0"/>
-              <a:t>GroupId</a:t>
-            </a:r>
-            <a:r>
-              <a:rPr lang="en-US" sz="1100" dirty="0" smtClean="0"/>
-              <a:t> = 1 },</a:t>
-            </a:r>
-          </a:p>
-          <a:p>
-            <a:pPr lvl="2"/>
+              <a:t>];</a:t>
+            </a:r>
+          </a:p>
+          <a:p>
+            <a:pPr marL="463550" indent="-342900"/>
             <a:r>
               <a:rPr lang="ru-RU" sz="1100" dirty="0" smtClean="0"/>
-              <a:t>}</a:t>
-            </a:r>
-            <a:r>
-              <a:rPr lang="en-US" sz="1100" dirty="0" smtClean="0"/>
-              <a:t>;</a:t>
-            </a:r>
-          </a:p>
-          <a:p>
-            <a:pPr lvl="2"/>
-            <a:r>
-              <a:rPr lang="ru-RU" dirty="0" smtClean="0"/>
-              <a:t>запрос, который сгруппирует студентов по </a:t>
-            </a:r>
-            <a:r>
-              <a:rPr lang="en-US" dirty="0" err="1" smtClean="0"/>
-              <a:t>GroupId</a:t>
-            </a:r>
-            <a:r>
-              <a:rPr lang="ru-RU" dirty="0" smtClean="0"/>
-              <a:t>.</a:t>
-            </a:r>
-          </a:p>
-          <a:p>
-            <a:pPr lvl="2"/>
-            <a:r>
-              <a:rPr lang="ru-RU" dirty="0"/>
-              <a:t> </a:t>
-            </a:r>
-            <a:r>
-              <a:rPr lang="ru-RU" dirty="0" smtClean="0"/>
-              <a:t> 4. Напишите запрос, выводящий количество студентов из п.3</a:t>
-            </a:r>
-          </a:p>
-          <a:p>
-            <a:pPr lvl="2"/>
-            <a:r>
-              <a:rPr lang="ru-RU" dirty="0"/>
-              <a:t> </a:t>
-            </a:r>
-            <a:r>
-              <a:rPr lang="ru-RU" dirty="0" smtClean="0"/>
-              <a:t> 5. Напишите запрос, сортирующий элементы коллекции из п.3 по убыванию идентификатора студента.</a:t>
+              <a:t>4.1 Выясните, есть ли значение: "</a:t>
+            </a:r>
+            <a:r>
+              <a:rPr lang="ru-RU" sz="1100" dirty="0" err="1" smtClean="0"/>
+              <a:t>the</a:t>
+            </a:r>
+            <a:r>
+              <a:rPr lang="ru-RU" sz="1100" dirty="0" smtClean="0"/>
+              <a:t>" в коллекции</a:t>
+            </a:r>
+          </a:p>
+          <a:p>
+            <a:pPr marL="463550" indent="-342900"/>
+            <a:r>
+              <a:rPr lang="ru-RU" sz="1100" dirty="0" smtClean="0"/>
+              <a:t>4.2 Создайте массив длин элементов(количество символов в строке)</a:t>
+            </a:r>
+          </a:p>
+          <a:p>
+            <a:pPr marL="463550" indent="-342900"/>
+            <a:r>
+              <a:rPr lang="ru-RU" sz="1100" dirty="0" smtClean="0"/>
+              <a:t>5. Даны 2 набора студентов (идентификатор, имя и номер группы)</a:t>
+            </a:r>
+          </a:p>
+          <a:p>
+            <a:pPr marL="463550" indent="-342900"/>
+            <a:r>
+              <a:rPr lang="ru-RU" sz="1100" dirty="0" smtClean="0"/>
+              <a:t>5.1 Выясните, есть ли повторяющиеся значения в разных наборах. Вывести повторяющихся.</a:t>
+            </a:r>
+          </a:p>
+          <a:p>
+            <a:pPr marL="463550" indent="-342900"/>
+            <a:r>
+              <a:rPr lang="ru-RU" sz="1100" dirty="0" smtClean="0"/>
+              <a:t>5.2 Создайте объединенную коллекцию из массивов студентов без дублирующихся записей.</a:t>
+            </a:r>
+          </a:p>
+          <a:p>
+            <a:pPr marL="463550" indent="-342900"/>
+            <a:r>
+              <a:rPr lang="ru-RU" sz="1100" dirty="0" smtClean="0"/>
+              <a:t>5.3 Найдите дублирующиеся записи студентов из разных наборов.</a:t>
             </a:r>
           </a:p>
         </p:txBody>

</xml_diff>